<commit_message>
small change to capitalization
</commit_message>
<xml_diff>
--- a/Poster/Final Final Version Poster.pptx
+++ b/Poster/Final Final Version Poster.pptx
@@ -3586,7 +3586,92 @@
                 <a:latin typeface="Arial" panose="020B0604020202020204" pitchFamily="34" charset="0"/>
                 <a:cs typeface="Arial" panose="020B0604020202020204" pitchFamily="34" charset="0"/>
               </a:rPr>
-              <a:t>For this project we built our own external cavity diode laser (ECDL) and Czerny-Turner Spectrometer to measure this effect. </a:t>
+              <a:t>For this project we built our </a:t>
+            </a:r>
+            <a:r>
+              <a:rPr lang="en-GB" sz="4000" b="0" i="0" u="none" strike="noStrike">
+                <a:solidFill>
+                  <a:srgbClr val="000000"/>
+                </a:solidFill>
+                <a:effectLst/>
+                <a:latin typeface="Arial" panose="020B0604020202020204" pitchFamily="34" charset="0"/>
+                <a:cs typeface="Arial" panose="020B0604020202020204" pitchFamily="34" charset="0"/>
+              </a:rPr>
+              <a:t>own External </a:t>
+            </a:r>
+            <a:r>
+              <a:rPr lang="en-GB" sz="4000">
+                <a:solidFill>
+                  <a:srgbClr val="000000"/>
+                </a:solidFill>
+                <a:latin typeface="Arial" panose="020B0604020202020204" pitchFamily="34" charset="0"/>
+                <a:cs typeface="Arial" panose="020B0604020202020204" pitchFamily="34" charset="0"/>
+              </a:rPr>
+              <a:t>C</a:t>
+            </a:r>
+            <a:r>
+              <a:rPr lang="en-GB" sz="4000" b="0" i="0" u="none" strike="noStrike">
+                <a:solidFill>
+                  <a:srgbClr val="000000"/>
+                </a:solidFill>
+                <a:effectLst/>
+                <a:latin typeface="Arial" panose="020B0604020202020204" pitchFamily="34" charset="0"/>
+                <a:cs typeface="Arial" panose="020B0604020202020204" pitchFamily="34" charset="0"/>
+              </a:rPr>
+              <a:t>avity </a:t>
+            </a:r>
+            <a:r>
+              <a:rPr lang="en-GB" sz="4000">
+                <a:solidFill>
+                  <a:srgbClr val="000000"/>
+                </a:solidFill>
+                <a:latin typeface="Arial" panose="020B0604020202020204" pitchFamily="34" charset="0"/>
+                <a:cs typeface="Arial" panose="020B0604020202020204" pitchFamily="34" charset="0"/>
+              </a:rPr>
+              <a:t>D</a:t>
+            </a:r>
+            <a:r>
+              <a:rPr lang="en-GB" sz="4000" b="0" i="0" u="none" strike="noStrike">
+                <a:solidFill>
+                  <a:srgbClr val="000000"/>
+                </a:solidFill>
+                <a:effectLst/>
+                <a:latin typeface="Arial" panose="020B0604020202020204" pitchFamily="34" charset="0"/>
+                <a:cs typeface="Arial" panose="020B0604020202020204" pitchFamily="34" charset="0"/>
+              </a:rPr>
+              <a:t>iode </a:t>
+            </a:r>
+            <a:r>
+              <a:rPr lang="en-GB" sz="4000" dirty="0">
+                <a:solidFill>
+                  <a:srgbClr val="000000"/>
+                </a:solidFill>
+                <a:latin typeface="Arial" panose="020B0604020202020204" pitchFamily="34" charset="0"/>
+                <a:cs typeface="Arial" panose="020B0604020202020204" pitchFamily="34" charset="0"/>
+              </a:rPr>
+              <a:t>L</a:t>
+            </a:r>
+            <a:r>
+              <a:rPr lang="en-GB" sz="4000" b="0" i="0" u="none" strike="noStrike">
+                <a:solidFill>
+                  <a:srgbClr val="000000"/>
+                </a:solidFill>
+                <a:effectLst/>
+                <a:latin typeface="Arial" panose="020B0604020202020204" pitchFamily="34" charset="0"/>
+                <a:cs typeface="Arial" panose="020B0604020202020204" pitchFamily="34" charset="0"/>
+              </a:rPr>
+              <a:t>aser </a:t>
+            </a:r>
+            <a:r>
+              <a:rPr lang="en-GB" sz="4000" b="0" i="0" u="none" strike="noStrike" dirty="0">
+                <a:solidFill>
+                  <a:srgbClr val="000000"/>
+                </a:solidFill>
+                <a:effectLst/>
+                <a:latin typeface="Arial" panose="020B0604020202020204" pitchFamily="34" charset="0"/>
+                <a:cs typeface="Arial" panose="020B0604020202020204" pitchFamily="34" charset="0"/>
+              </a:rPr>
+              <a:t>(ECDL) and Czerny-Turner Spectrometer to measure this effect. </a:t>
             </a:r>
             <a:endParaRPr lang="en-NL" sz="4000" dirty="0">
               <a:latin typeface="Arial" panose="020B0604020202020204" pitchFamily="34" charset="0"/>

</xml_diff>

<commit_message>
Changed figure and exported pdf
</commit_message>
<xml_diff>
--- a/Poster/Final Final Version Poster.pptx
+++ b/Poster/Final Final Version Poster.pptx
@@ -115,17 +115,25 @@
 </p:presentation>
 </file>
 
+<file path=ppt/revisionInfo.xml><?xml version="1.0" encoding="utf-8"?>
+<p1510:revInfo xmlns:a="http://schemas.openxmlformats.org/drawingml/2006/main" xmlns:r="http://schemas.openxmlformats.org/officeDocument/2006/relationships" xmlns:p1510="http://schemas.microsoft.com/office/powerpoint/2015/10/main">
+  <p1510:revLst>
+    <p1510:client id="{82AC0502-EA9B-4877-8C2C-B2C7E622D405}" v="179" dt="2023-06-26T19:59:25.537"/>
+  </p1510:revLst>
+</p1510:revInfo>
+</file>
+
 <file path=ppt/changesInfos/changesInfo1.xml><?xml version="1.0" encoding="utf-8"?>
 <pc:chgInfo xmlns:a="http://schemas.openxmlformats.org/drawingml/2006/main" xmlns:r="http://schemas.openxmlformats.org/officeDocument/2006/relationships" xmlns:ac="http://schemas.microsoft.com/office/drawing/2013/main/command" xmlns:pc="http://schemas.microsoft.com/office/powerpoint/2013/main/command">
   <pc:docChgLst>
     <pc:chgData name="Emils Zegers" userId="bd5cf22c-0e97-44c0-acad-9bc9915da531" providerId="ADAL" clId="{82AC0502-EA9B-4877-8C2C-B2C7E622D405}"/>
     <pc:docChg chg="modSld">
-      <pc:chgData name="Emils Zegers" userId="bd5cf22c-0e97-44c0-acad-9bc9915da531" providerId="ADAL" clId="{82AC0502-EA9B-4877-8C2C-B2C7E622D405}" dt="2023-06-26T18:01:49.378" v="5" actId="20577"/>
+      <pc:chgData name="Emils Zegers" userId="bd5cf22c-0e97-44c0-acad-9bc9915da531" providerId="ADAL" clId="{82AC0502-EA9B-4877-8C2C-B2C7E622D405}" dt="2023-06-26T19:59:25.537" v="184"/>
       <pc:docMkLst>
         <pc:docMk/>
       </pc:docMkLst>
-      <pc:sldChg chg="modSp mod">
-        <pc:chgData name="Emils Zegers" userId="bd5cf22c-0e97-44c0-acad-9bc9915da531" providerId="ADAL" clId="{82AC0502-EA9B-4877-8C2C-B2C7E622D405}" dt="2023-06-26T18:01:49.378" v="5" actId="20577"/>
+      <pc:sldChg chg="modSp mod setBg">
+        <pc:chgData name="Emils Zegers" userId="bd5cf22c-0e97-44c0-acad-9bc9915da531" providerId="ADAL" clId="{82AC0502-EA9B-4877-8C2C-B2C7E622D405}" dt="2023-06-26T19:59:25.537" v="184"/>
         <pc:sldMkLst>
           <pc:docMk/>
           <pc:sldMk cId="605312590" sldId="256"/>
@@ -3436,6 +3444,8 @@
             <a:gs pos="0">
               <a:srgbClr val="FF0000">
                 <a:alpha val="48000"/>
+                <a:lumMod val="74000"/>
+                <a:lumOff val="26000"/>
               </a:srgbClr>
             </a:gs>
             <a:gs pos="53000">
@@ -3446,7 +3456,9 @@
             </a:gs>
             <a:gs pos="100000">
               <a:srgbClr val="FF0000">
-                <a:alpha val="38000"/>
+                <a:alpha val="48000"/>
+                <a:lumMod val="62000"/>
+                <a:lumOff val="38000"/>
               </a:srgbClr>
             </a:gs>
           </a:gsLst>

</xml_diff>